<commit_message>
add geometry blender ver.
</commit_message>
<xml_diff>
--- a/論文/figures/Figures&Tables.pptx
+++ b/論文/figures/Figures&Tables.pptx
@@ -206,7 +206,7 @@
           <a:p>
             <a:fld id="{CF2BC990-631B-44C0-9708-8FFAA36D913C}" type="datetimeFigureOut">
               <a:rPr kumimoji="1" lang="ja-JP" altLang="en-US" smtClean="0"/>
-              <a:t>2019/8/20</a:t>
+              <a:t>2019/8/30</a:t>
             </a:fld>
             <a:endParaRPr kumimoji="1" lang="ja-JP" altLang="en-US"/>
           </a:p>
@@ -420,7 +420,7 @@
           <a:p>
             <a:fld id="{0BA0E0C8-02F0-4E03-83F6-93C841C817A4}" type="datetimeFigureOut">
               <a:rPr kumimoji="1" lang="ja-JP" altLang="en-US" smtClean="0"/>
-              <a:t>2019/8/20</a:t>
+              <a:t>2019/8/30</a:t>
             </a:fld>
             <a:endParaRPr kumimoji="1" lang="ja-JP" altLang="en-US"/>
           </a:p>
@@ -622,7 +622,7 @@
           <a:p>
             <a:fld id="{0BA0E0C8-02F0-4E03-83F6-93C841C817A4}" type="datetimeFigureOut">
               <a:rPr kumimoji="1" lang="ja-JP" altLang="en-US" smtClean="0"/>
-              <a:t>2019/8/20</a:t>
+              <a:t>2019/8/30</a:t>
             </a:fld>
             <a:endParaRPr kumimoji="1" lang="ja-JP" altLang="en-US"/>
           </a:p>
@@ -834,7 +834,7 @@
           <a:p>
             <a:fld id="{0BA0E0C8-02F0-4E03-83F6-93C841C817A4}" type="datetimeFigureOut">
               <a:rPr kumimoji="1" lang="ja-JP" altLang="en-US" smtClean="0"/>
-              <a:t>2019/8/20</a:t>
+              <a:t>2019/8/30</a:t>
             </a:fld>
             <a:endParaRPr kumimoji="1" lang="ja-JP" altLang="en-US"/>
           </a:p>
@@ -1036,7 +1036,7 @@
           <a:p>
             <a:fld id="{0BA0E0C8-02F0-4E03-83F6-93C841C817A4}" type="datetimeFigureOut">
               <a:rPr kumimoji="1" lang="ja-JP" altLang="en-US" smtClean="0"/>
-              <a:t>2019/8/20</a:t>
+              <a:t>2019/8/30</a:t>
             </a:fld>
             <a:endParaRPr kumimoji="1" lang="ja-JP" altLang="en-US"/>
           </a:p>
@@ -1280,7 +1280,7 @@
           <a:p>
             <a:fld id="{0BA0E0C8-02F0-4E03-83F6-93C841C817A4}" type="datetimeFigureOut">
               <a:rPr kumimoji="1" lang="ja-JP" altLang="en-US" smtClean="0"/>
-              <a:t>2019/8/20</a:t>
+              <a:t>2019/8/30</a:t>
             </a:fld>
             <a:endParaRPr kumimoji="1" lang="ja-JP" altLang="en-US"/>
           </a:p>
@@ -1576,7 +1576,7 @@
           <a:p>
             <a:fld id="{0BA0E0C8-02F0-4E03-83F6-93C841C817A4}" type="datetimeFigureOut">
               <a:rPr kumimoji="1" lang="ja-JP" altLang="en-US" smtClean="0"/>
-              <a:t>2019/8/20</a:t>
+              <a:t>2019/8/30</a:t>
             </a:fld>
             <a:endParaRPr kumimoji="1" lang="ja-JP" altLang="en-US"/>
           </a:p>
@@ -2007,7 +2007,7 @@
           <a:p>
             <a:fld id="{0BA0E0C8-02F0-4E03-83F6-93C841C817A4}" type="datetimeFigureOut">
               <a:rPr kumimoji="1" lang="ja-JP" altLang="en-US" smtClean="0"/>
-              <a:t>2019/8/20</a:t>
+              <a:t>2019/8/30</a:t>
             </a:fld>
             <a:endParaRPr kumimoji="1" lang="ja-JP" altLang="en-US"/>
           </a:p>
@@ -2125,7 +2125,7 @@
           <a:p>
             <a:fld id="{0BA0E0C8-02F0-4E03-83F6-93C841C817A4}" type="datetimeFigureOut">
               <a:rPr kumimoji="1" lang="ja-JP" altLang="en-US" smtClean="0"/>
-              <a:t>2019/8/20</a:t>
+              <a:t>2019/8/30</a:t>
             </a:fld>
             <a:endParaRPr kumimoji="1" lang="ja-JP" altLang="en-US"/>
           </a:p>
@@ -2220,7 +2220,7 @@
           <a:p>
             <a:fld id="{0BA0E0C8-02F0-4E03-83F6-93C841C817A4}" type="datetimeFigureOut">
               <a:rPr kumimoji="1" lang="ja-JP" altLang="en-US" smtClean="0"/>
-              <a:t>2019/8/20</a:t>
+              <a:t>2019/8/30</a:t>
             </a:fld>
             <a:endParaRPr kumimoji="1" lang="ja-JP" altLang="en-US"/>
           </a:p>
@@ -2529,7 +2529,7 @@
           <a:p>
             <a:fld id="{0BA0E0C8-02F0-4E03-83F6-93C841C817A4}" type="datetimeFigureOut">
               <a:rPr kumimoji="1" lang="ja-JP" altLang="en-US" smtClean="0"/>
-              <a:t>2019/8/20</a:t>
+              <a:t>2019/8/30</a:t>
             </a:fld>
             <a:endParaRPr kumimoji="1" lang="ja-JP" altLang="en-US"/>
           </a:p>
@@ -2786,7 +2786,7 @@
           <a:p>
             <a:fld id="{0BA0E0C8-02F0-4E03-83F6-93C841C817A4}" type="datetimeFigureOut">
               <a:rPr kumimoji="1" lang="ja-JP" altLang="en-US" smtClean="0"/>
-              <a:t>2019/8/20</a:t>
+              <a:t>2019/8/30</a:t>
             </a:fld>
             <a:endParaRPr kumimoji="1" lang="ja-JP" altLang="en-US"/>
           </a:p>
@@ -3031,7 +3031,7 @@
           <a:p>
             <a:fld id="{0BA0E0C8-02F0-4E03-83F6-93C841C817A4}" type="datetimeFigureOut">
               <a:rPr kumimoji="1" lang="ja-JP" altLang="en-US" smtClean="0"/>
-              <a:t>2019/8/20</a:t>
+              <a:t>2019/8/30</a:t>
             </a:fld>
             <a:endParaRPr kumimoji="1" lang="ja-JP" altLang="en-US"/>
           </a:p>
@@ -3436,46 +3436,9 @@
           <a:chExt cx="0" cy="0"/>
         </a:xfrm>
       </p:grpSpPr>
-      <p:sp>
-        <p:nvSpPr>
-          <p:cNvPr id="8" name="テキスト ボックス 7"/>
-          <p:cNvSpPr txBox="1"/>
-          <p:nvPr/>
-        </p:nvSpPr>
-        <p:spPr>
-          <a:xfrm>
-            <a:off x="498436" y="7045444"/>
-            <a:ext cx="5778000" cy="369332"/>
-          </a:xfrm>
-          <a:prstGeom prst="rect">
-            <a:avLst/>
-          </a:prstGeom>
-          <a:noFill/>
-        </p:spPr>
-        <p:txBody>
-          <a:bodyPr wrap="square" rtlCol="0">
-            <a:spAutoFit/>
-          </a:bodyPr>
-          <a:lstStyle/>
-          <a:p>
-            <a:pPr algn="ctr"/>
-            <a:r>
-              <a:rPr kumimoji="1" lang="en-US" altLang="ja-JP" dirty="0" smtClean="0">
-                <a:latin typeface="Times New Roman" panose="02020603050405020304" pitchFamily="18" charset="0"/>
-                <a:cs typeface="Times New Roman" panose="02020603050405020304" pitchFamily="18" charset="0"/>
-              </a:rPr>
-              <a:t>Figure 1. Schematic diagram</a:t>
-            </a:r>
-            <a:endParaRPr kumimoji="1" lang="ja-JP" altLang="en-US" dirty="0">
-              <a:latin typeface="Times New Roman" panose="02020603050405020304" pitchFamily="18" charset="0"/>
-              <a:cs typeface="Times New Roman" panose="02020603050405020304" pitchFamily="18" charset="0"/>
-            </a:endParaRPr>
-          </a:p>
-        </p:txBody>
-      </p:sp>
       <p:pic>
         <p:nvPicPr>
-          <p:cNvPr id="4" name="図 3"/>
+          <p:cNvPr id="2" name="図 1"/>
           <p:cNvPicPr>
             <a:picLocks noChangeAspect="1"/>
           </p:cNvPicPr>
@@ -3495,14 +3458,51 @@
         </p:blipFill>
         <p:spPr>
           <a:xfrm>
-            <a:off x="1253836" y="1847282"/>
-            <a:ext cx="4267200" cy="5009321"/>
+            <a:off x="464127" y="982926"/>
+            <a:ext cx="5999018" cy="5999018"/>
           </a:xfrm>
           <a:prstGeom prst="rect">
             <a:avLst/>
           </a:prstGeom>
         </p:spPr>
       </p:pic>
+      <p:sp>
+        <p:nvSpPr>
+          <p:cNvPr id="5" name="テキスト ボックス 4"/>
+          <p:cNvSpPr txBox="1"/>
+          <p:nvPr/>
+        </p:nvSpPr>
+        <p:spPr>
+          <a:xfrm>
+            <a:off x="498435" y="7045444"/>
+            <a:ext cx="5964709" cy="369332"/>
+          </a:xfrm>
+          <a:prstGeom prst="rect">
+            <a:avLst/>
+          </a:prstGeom>
+          <a:noFill/>
+        </p:spPr>
+        <p:txBody>
+          <a:bodyPr wrap="square" rtlCol="0">
+            <a:spAutoFit/>
+          </a:bodyPr>
+          <a:lstStyle/>
+          <a:p>
+            <a:pPr algn="ctr"/>
+            <a:r>
+              <a:rPr kumimoji="1" lang="en-US" altLang="ja-JP" dirty="0" smtClean="0">
+                <a:latin typeface="Times New Roman" panose="02020603050405020304" pitchFamily="18" charset="0"/>
+                <a:cs typeface="Times New Roman" panose="02020603050405020304" pitchFamily="18" charset="0"/>
+              </a:rPr>
+              <a:t>Figure 1. Schematic diagram</a:t>
+            </a:r>
+            <a:endParaRPr kumimoji="1" lang="ja-JP" altLang="en-US" dirty="0">
+              <a:latin typeface="Times New Roman" panose="02020603050405020304" pitchFamily="18" charset="0"/>
+              <a:cs typeface="Times New Roman" panose="02020603050405020304" pitchFamily="18" charset="0"/>
+            </a:endParaRPr>
+          </a:p>
+        </p:txBody>
+      </p:sp>
     </p:spTree>
     <p:extLst>
       <p:ext uri="{BB962C8B-B14F-4D97-AF65-F5344CB8AC3E}">
@@ -3597,14 +3597,7 @@
                 <a:latin typeface="Times New Roman" panose="02020603050405020304" pitchFamily="18" charset="0"/>
                 <a:cs typeface="Times New Roman" panose="02020603050405020304" pitchFamily="18" charset="0"/>
               </a:rPr>
-              <a:t>12. Bubble </a:t>
-            </a:r>
-            <a:r>
-              <a:rPr lang="en-US" altLang="ja-JP" dirty="0" smtClean="0">
-                <a:latin typeface="Times New Roman" panose="02020603050405020304" pitchFamily="18" charset="0"/>
-                <a:cs typeface="Times New Roman" panose="02020603050405020304" pitchFamily="18" charset="0"/>
-              </a:rPr>
-              <a:t>movement</a:t>
+              <a:t>12. Bubble movement</a:t>
             </a:r>
             <a:endParaRPr kumimoji="1" lang="ja-JP" altLang="en-US" dirty="0">
               <a:latin typeface="Times New Roman" panose="02020603050405020304" pitchFamily="18" charset="0"/>
@@ -5302,21 +5295,7 @@
                 <a:latin typeface="Times New Roman" panose="02020603050405020304" pitchFamily="18" charset="0"/>
                 <a:cs typeface="Times New Roman" panose="02020603050405020304" pitchFamily="18" charset="0"/>
               </a:rPr>
-              <a:t>. Flux of powder </a:t>
-            </a:r>
-            <a:r>
-              <a:rPr lang="en-US" altLang="ja-JP" dirty="0" smtClean="0">
-                <a:latin typeface="Times New Roman" panose="02020603050405020304" pitchFamily="18" charset="0"/>
-                <a:cs typeface="Times New Roman" panose="02020603050405020304" pitchFamily="18" charset="0"/>
-              </a:rPr>
-              <a:t>into </a:t>
-            </a:r>
-            <a:r>
-              <a:rPr lang="en-US" altLang="ja-JP" dirty="0" smtClean="0">
-                <a:latin typeface="Times New Roman" panose="02020603050405020304" pitchFamily="18" charset="0"/>
-                <a:cs typeface="Times New Roman" panose="02020603050405020304" pitchFamily="18" charset="0"/>
-              </a:rPr>
-              <a:t>die region</a:t>
+              <a:t>. Flux of powder into die region</a:t>
             </a:r>
             <a:endParaRPr kumimoji="1" lang="ja-JP" altLang="en-US" dirty="0">
               <a:latin typeface="Times New Roman" panose="02020603050405020304" pitchFamily="18" charset="0"/>
@@ -5677,28 +5656,7 @@
                 <a:latin typeface="Times New Roman" panose="02020603050405020304" pitchFamily="18" charset="0"/>
                 <a:cs typeface="Times New Roman" panose="02020603050405020304" pitchFamily="18" charset="0"/>
               </a:rPr>
-              <a:t>. </a:t>
-            </a:r>
-            <a:r>
-              <a:rPr lang="en-US" altLang="ja-JP" dirty="0" smtClean="0">
-                <a:latin typeface="Times New Roman" panose="02020603050405020304" pitchFamily="18" charset="0"/>
-                <a:cs typeface="Times New Roman" panose="02020603050405020304" pitchFamily="18" charset="0"/>
-              </a:rPr>
-              <a:t>Forces </a:t>
-            </a:r>
-            <a:r>
-              <a:rPr lang="en-US" altLang="ja-JP" dirty="0" smtClean="0">
-                <a:latin typeface="Times New Roman" panose="02020603050405020304" pitchFamily="18" charset="0"/>
-                <a:cs typeface="Times New Roman" panose="02020603050405020304" pitchFamily="18" charset="0"/>
-              </a:rPr>
-              <a:t>applied on </a:t>
-            </a:r>
-            <a:r>
-              <a:rPr lang="en-US" altLang="ja-JP" dirty="0" smtClean="0">
-                <a:latin typeface="Times New Roman" panose="02020603050405020304" pitchFamily="18" charset="0"/>
-                <a:cs typeface="Times New Roman" panose="02020603050405020304" pitchFamily="18" charset="0"/>
-              </a:rPr>
-              <a:t>particles (</a:t>
+              <a:t>. Forces applied on particles (</a:t>
             </a:r>
             <a:r>
               <a:rPr lang="en-US" altLang="ja-JP" dirty="0">
@@ -5714,10 +5672,6 @@
               </a:rPr>
               <a:t>ertical component)</a:t>
             </a:r>
-            <a:endParaRPr lang="en-US" altLang="ja-JP" dirty="0" smtClean="0">
-              <a:latin typeface="Times New Roman" panose="02020603050405020304" pitchFamily="18" charset="0"/>
-              <a:cs typeface="Times New Roman" panose="02020603050405020304" pitchFamily="18" charset="0"/>
-            </a:endParaRPr>
           </a:p>
         </p:txBody>
       </p:sp>
@@ -6073,21 +6027,7 @@
                 <a:latin typeface="Times New Roman" panose="02020603050405020304" pitchFamily="18" charset="0"/>
                 <a:cs typeface="Times New Roman" panose="02020603050405020304" pitchFamily="18" charset="0"/>
               </a:rPr>
-              <a:t>. Flux of powder </a:t>
-            </a:r>
-            <a:r>
-              <a:rPr lang="en-US" altLang="ja-JP" dirty="0" smtClean="0">
-                <a:latin typeface="Times New Roman" panose="02020603050405020304" pitchFamily="18" charset="0"/>
-                <a:cs typeface="Times New Roman" panose="02020603050405020304" pitchFamily="18" charset="0"/>
-              </a:rPr>
-              <a:t>into </a:t>
-            </a:r>
-            <a:r>
-              <a:rPr lang="en-US" altLang="ja-JP" dirty="0" smtClean="0">
-                <a:latin typeface="Times New Roman" panose="02020603050405020304" pitchFamily="18" charset="0"/>
-                <a:cs typeface="Times New Roman" panose="02020603050405020304" pitchFamily="18" charset="0"/>
-              </a:rPr>
-              <a:t>die region</a:t>
+              <a:t>. Flux of powder into die region</a:t>
             </a:r>
             <a:endParaRPr kumimoji="1" lang="ja-JP" altLang="en-US" dirty="0">
               <a:latin typeface="Times New Roman" panose="02020603050405020304" pitchFamily="18" charset="0"/>
@@ -6221,14 +6161,7 @@
                 <a:latin typeface="Times New Roman" panose="02020603050405020304" pitchFamily="18" charset="0"/>
                 <a:cs typeface="Times New Roman" panose="02020603050405020304" pitchFamily="18" charset="0"/>
               </a:rPr>
-              <a:t>10. Drag </a:t>
-            </a:r>
-            <a:r>
-              <a:rPr lang="en-US" altLang="ja-JP" dirty="0" smtClean="0">
-                <a:latin typeface="Times New Roman" panose="02020603050405020304" pitchFamily="18" charset="0"/>
-                <a:cs typeface="Times New Roman" panose="02020603050405020304" pitchFamily="18" charset="0"/>
-              </a:rPr>
-              <a:t>force</a:t>
+              <a:t>10. Drag force</a:t>
             </a:r>
             <a:endParaRPr kumimoji="1" lang="ja-JP" altLang="en-US" dirty="0">
               <a:latin typeface="Times New Roman" panose="02020603050405020304" pitchFamily="18" charset="0"/>
@@ -6272,14 +6205,7 @@
                 <a:latin typeface="Times New Roman" panose="02020603050405020304" pitchFamily="18" charset="0"/>
                 <a:cs typeface="Times New Roman" panose="02020603050405020304" pitchFamily="18" charset="0"/>
               </a:rPr>
-              <a:t>11. Pressure </a:t>
-            </a:r>
-            <a:r>
-              <a:rPr lang="en-US" altLang="ja-JP" dirty="0" smtClean="0">
-                <a:latin typeface="Times New Roman" panose="02020603050405020304" pitchFamily="18" charset="0"/>
-                <a:cs typeface="Times New Roman" panose="02020603050405020304" pitchFamily="18" charset="0"/>
-              </a:rPr>
-              <a:t>force</a:t>
+              <a:t>11. Pressure force</a:t>
             </a:r>
             <a:endParaRPr kumimoji="1" lang="ja-JP" altLang="en-US" dirty="0">
               <a:latin typeface="Times New Roman" panose="02020603050405020304" pitchFamily="18" charset="0"/>

</xml_diff>

<commit_message>
geometry, snapshot, air volume
</commit_message>
<xml_diff>
--- a/論文/figures/Figures&Tables.pptx
+++ b/論文/figures/Figures&Tables.pptx
@@ -5,7 +5,7 @@
     <p:sldMasterId id="2147483660" r:id="rId1"/>
   </p:sldMasterIdLst>
   <p:handoutMasterIdLst>
-    <p:handoutMasterId r:id="rId14"/>
+    <p:handoutMasterId r:id="rId15"/>
   </p:handoutMasterIdLst>
   <p:sldIdLst>
     <p:sldId id="257" r:id="rId2"/>
@@ -20,6 +20,7 @@
     <p:sldId id="279" r:id="rId11"/>
     <p:sldId id="277" r:id="rId12"/>
     <p:sldId id="271" r:id="rId13"/>
+    <p:sldId id="280" r:id="rId14"/>
   </p:sldIdLst>
   <p:sldSz cx="6858000" cy="9906000" type="A4"/>
   <p:notesSz cx="9144000" cy="6858000"/>
@@ -208,7 +209,7 @@
           <a:p>
             <a:fld id="{CF2BC990-631B-44C0-9708-8FFAA36D913C}" type="datetimeFigureOut">
               <a:rPr kumimoji="1" lang="ja-JP" altLang="en-US" smtClean="0"/>
-              <a:t>2019/9/2</a:t>
+              <a:t>2019/9/6</a:t>
             </a:fld>
             <a:endParaRPr kumimoji="1" lang="ja-JP" altLang="en-US"/>
           </a:p>
@@ -422,7 +423,7 @@
           <a:p>
             <a:fld id="{0BA0E0C8-02F0-4E03-83F6-93C841C817A4}" type="datetimeFigureOut">
               <a:rPr kumimoji="1" lang="ja-JP" altLang="en-US" smtClean="0"/>
-              <a:t>2019/9/2</a:t>
+              <a:t>2019/9/6</a:t>
             </a:fld>
             <a:endParaRPr kumimoji="1" lang="ja-JP" altLang="en-US"/>
           </a:p>
@@ -624,7 +625,7 @@
           <a:p>
             <a:fld id="{0BA0E0C8-02F0-4E03-83F6-93C841C817A4}" type="datetimeFigureOut">
               <a:rPr kumimoji="1" lang="ja-JP" altLang="en-US" smtClean="0"/>
-              <a:t>2019/9/2</a:t>
+              <a:t>2019/9/6</a:t>
             </a:fld>
             <a:endParaRPr kumimoji="1" lang="ja-JP" altLang="en-US"/>
           </a:p>
@@ -836,7 +837,7 @@
           <a:p>
             <a:fld id="{0BA0E0C8-02F0-4E03-83F6-93C841C817A4}" type="datetimeFigureOut">
               <a:rPr kumimoji="1" lang="ja-JP" altLang="en-US" smtClean="0"/>
-              <a:t>2019/9/2</a:t>
+              <a:t>2019/9/6</a:t>
             </a:fld>
             <a:endParaRPr kumimoji="1" lang="ja-JP" altLang="en-US"/>
           </a:p>
@@ -1038,7 +1039,7 @@
           <a:p>
             <a:fld id="{0BA0E0C8-02F0-4E03-83F6-93C841C817A4}" type="datetimeFigureOut">
               <a:rPr kumimoji="1" lang="ja-JP" altLang="en-US" smtClean="0"/>
-              <a:t>2019/9/2</a:t>
+              <a:t>2019/9/6</a:t>
             </a:fld>
             <a:endParaRPr kumimoji="1" lang="ja-JP" altLang="en-US"/>
           </a:p>
@@ -1282,7 +1283,7 @@
           <a:p>
             <a:fld id="{0BA0E0C8-02F0-4E03-83F6-93C841C817A4}" type="datetimeFigureOut">
               <a:rPr kumimoji="1" lang="ja-JP" altLang="en-US" smtClean="0"/>
-              <a:t>2019/9/2</a:t>
+              <a:t>2019/9/6</a:t>
             </a:fld>
             <a:endParaRPr kumimoji="1" lang="ja-JP" altLang="en-US"/>
           </a:p>
@@ -1578,7 +1579,7 @@
           <a:p>
             <a:fld id="{0BA0E0C8-02F0-4E03-83F6-93C841C817A4}" type="datetimeFigureOut">
               <a:rPr kumimoji="1" lang="ja-JP" altLang="en-US" smtClean="0"/>
-              <a:t>2019/9/2</a:t>
+              <a:t>2019/9/6</a:t>
             </a:fld>
             <a:endParaRPr kumimoji="1" lang="ja-JP" altLang="en-US"/>
           </a:p>
@@ -2009,7 +2010,7 @@
           <a:p>
             <a:fld id="{0BA0E0C8-02F0-4E03-83F6-93C841C817A4}" type="datetimeFigureOut">
               <a:rPr kumimoji="1" lang="ja-JP" altLang="en-US" smtClean="0"/>
-              <a:t>2019/9/2</a:t>
+              <a:t>2019/9/6</a:t>
             </a:fld>
             <a:endParaRPr kumimoji="1" lang="ja-JP" altLang="en-US"/>
           </a:p>
@@ -2127,7 +2128,7 @@
           <a:p>
             <a:fld id="{0BA0E0C8-02F0-4E03-83F6-93C841C817A4}" type="datetimeFigureOut">
               <a:rPr kumimoji="1" lang="ja-JP" altLang="en-US" smtClean="0"/>
-              <a:t>2019/9/2</a:t>
+              <a:t>2019/9/6</a:t>
             </a:fld>
             <a:endParaRPr kumimoji="1" lang="ja-JP" altLang="en-US"/>
           </a:p>
@@ -2222,7 +2223,7 @@
           <a:p>
             <a:fld id="{0BA0E0C8-02F0-4E03-83F6-93C841C817A4}" type="datetimeFigureOut">
               <a:rPr kumimoji="1" lang="ja-JP" altLang="en-US" smtClean="0"/>
-              <a:t>2019/9/2</a:t>
+              <a:t>2019/9/6</a:t>
             </a:fld>
             <a:endParaRPr kumimoji="1" lang="ja-JP" altLang="en-US"/>
           </a:p>
@@ -2531,7 +2532,7 @@
           <a:p>
             <a:fld id="{0BA0E0C8-02F0-4E03-83F6-93C841C817A4}" type="datetimeFigureOut">
               <a:rPr kumimoji="1" lang="ja-JP" altLang="en-US" smtClean="0"/>
-              <a:t>2019/9/2</a:t>
+              <a:t>2019/9/6</a:t>
             </a:fld>
             <a:endParaRPr kumimoji="1" lang="ja-JP" altLang="en-US"/>
           </a:p>
@@ -2788,7 +2789,7 @@
           <a:p>
             <a:fld id="{0BA0E0C8-02F0-4E03-83F6-93C841C817A4}" type="datetimeFigureOut">
               <a:rPr kumimoji="1" lang="ja-JP" altLang="en-US" smtClean="0"/>
-              <a:t>2019/9/2</a:t>
+              <a:t>2019/9/6</a:t>
             </a:fld>
             <a:endParaRPr kumimoji="1" lang="ja-JP" altLang="en-US"/>
           </a:p>
@@ -3033,7 +3034,7 @@
           <a:p>
             <a:fld id="{0BA0E0C8-02F0-4E03-83F6-93C841C817A4}" type="datetimeFigureOut">
               <a:rPr kumimoji="1" lang="ja-JP" altLang="en-US" smtClean="0"/>
-              <a:t>2019/9/2</a:t>
+              <a:t>2019/9/6</a:t>
             </a:fld>
             <a:endParaRPr kumimoji="1" lang="ja-JP" altLang="en-US"/>
           </a:p>
@@ -3460,8 +3461,8 @@
         </p:blipFill>
         <p:spPr>
           <a:xfrm>
-            <a:off x="464127" y="982926"/>
-            <a:ext cx="5999018" cy="5999018"/>
+            <a:off x="432376" y="1018717"/>
+            <a:ext cx="6026727" cy="6026727"/>
           </a:xfrm>
           <a:prstGeom prst="rect">
             <a:avLst/>
@@ -3563,14 +3564,7 @@
                 <a:latin typeface="Times New Roman" panose="02020603050405020304" pitchFamily="18" charset="0"/>
                 <a:cs typeface="Times New Roman" panose="02020603050405020304" pitchFamily="18" charset="0"/>
               </a:rPr>
-              <a:t>Figure </a:t>
-            </a:r>
-            <a:r>
-              <a:rPr lang="en-US" altLang="ja-JP" dirty="0">
-                <a:latin typeface="Times New Roman" panose="02020603050405020304" pitchFamily="18" charset="0"/>
-                <a:cs typeface="Times New Roman" panose="02020603050405020304" pitchFamily="18" charset="0"/>
-              </a:rPr>
-              <a:t>5</a:t>
+              <a:t>Figure 11</a:t>
             </a:r>
             <a:r>
               <a:rPr lang="en-US" altLang="ja-JP" dirty="0" smtClean="0">
@@ -3710,7 +3704,7 @@
                 <a:latin typeface="Times New Roman" panose="02020603050405020304" pitchFamily="18" charset="0"/>
                 <a:cs typeface="Times New Roman" panose="02020603050405020304" pitchFamily="18" charset="0"/>
               </a:rPr>
-              <a:t>10. Number of suctioned particles by drag force</a:t>
+              <a:t>12. Number of suctioned particles by drag force</a:t>
             </a:r>
             <a:endParaRPr kumimoji="1" lang="ja-JP" altLang="en-US" dirty="0">
               <a:latin typeface="Times New Roman" panose="02020603050405020304" pitchFamily="18" charset="0"/>
@@ -3754,7 +3748,7 @@
                 <a:latin typeface="Times New Roman" panose="02020603050405020304" pitchFamily="18" charset="0"/>
                 <a:cs typeface="Times New Roman" panose="02020603050405020304" pitchFamily="18" charset="0"/>
               </a:rPr>
-              <a:t>11. Number of suctioned particles by pressure gradient</a:t>
+              <a:t>13. Number of suctioned particles by pressure gradient</a:t>
             </a:r>
             <a:endParaRPr kumimoji="1" lang="ja-JP" altLang="en-US" dirty="0">
               <a:latin typeface="Times New Roman" panose="02020603050405020304" pitchFamily="18" charset="0"/>
@@ -3877,18 +3871,25 @@
           <a:p>
             <a:pPr algn="ctr"/>
             <a:r>
-              <a:rPr kumimoji="1" lang="en-US" altLang="ja-JP" dirty="0" smtClean="0">
+              <a:rPr kumimoji="1" lang="en-US" altLang="ja-JP" smtClean="0">
                 <a:latin typeface="Times New Roman" panose="02020603050405020304" pitchFamily="18" charset="0"/>
                 <a:cs typeface="Times New Roman" panose="02020603050405020304" pitchFamily="18" charset="0"/>
               </a:rPr>
               <a:t>Figure </a:t>
             </a:r>
             <a:r>
+              <a:rPr lang="en-US" altLang="ja-JP" smtClean="0">
+                <a:latin typeface="Times New Roman" panose="02020603050405020304" pitchFamily="18" charset="0"/>
+                <a:cs typeface="Times New Roman" panose="02020603050405020304" pitchFamily="18" charset="0"/>
+              </a:rPr>
+              <a:t>14. </a:t>
+            </a:r>
+            <a:r>
               <a:rPr lang="en-US" altLang="ja-JP" dirty="0" smtClean="0">
                 <a:latin typeface="Times New Roman" panose="02020603050405020304" pitchFamily="18" charset="0"/>
                 <a:cs typeface="Times New Roman" panose="02020603050405020304" pitchFamily="18" charset="0"/>
               </a:rPr>
-              <a:t>12. Bubble movement</a:t>
+              <a:t>Bubble movement</a:t>
             </a:r>
             <a:endParaRPr kumimoji="1" lang="ja-JP" altLang="en-US" dirty="0">
               <a:latin typeface="Times New Roman" panose="02020603050405020304" pitchFamily="18" charset="0"/>
@@ -3960,6 +3961,117 @@
     <p:extLst>
       <p:ext uri="{BB962C8B-B14F-4D97-AF65-F5344CB8AC3E}">
         <p14:creationId xmlns:p14="http://schemas.microsoft.com/office/powerpoint/2010/main" val="1018302082"/>
+      </p:ext>
+    </p:extLst>
+  </p:cSld>
+  <p:clrMapOvr>
+    <a:masterClrMapping/>
+  </p:clrMapOvr>
+</p:sld>
+</file>
+
+<file path=ppt/slides/slide13.xml><?xml version="1.0" encoding="utf-8"?>
+<p:sld xmlns:a="http://schemas.openxmlformats.org/drawingml/2006/main" xmlns:r="http://schemas.openxmlformats.org/officeDocument/2006/relationships" xmlns:p="http://schemas.openxmlformats.org/presentationml/2006/main">
+  <p:cSld>
+    <p:spTree>
+      <p:nvGrpSpPr>
+        <p:cNvPr id="1" name=""/>
+        <p:cNvGrpSpPr/>
+        <p:nvPr/>
+      </p:nvGrpSpPr>
+      <p:grpSpPr>
+        <a:xfrm>
+          <a:off x="0" y="0"/>
+          <a:ext cx="0" cy="0"/>
+          <a:chOff x="0" y="0"/>
+          <a:chExt cx="0" cy="0"/>
+        </a:xfrm>
+      </p:grpSpPr>
+      <p:pic>
+        <p:nvPicPr>
+          <p:cNvPr id="2" name="図 1"/>
+          <p:cNvPicPr>
+            <a:picLocks noChangeAspect="1"/>
+          </p:cNvPicPr>
+          <p:nvPr/>
+        </p:nvPicPr>
+        <p:blipFill>
+          <a:blip r:embed="rId2">
+            <a:extLst>
+              <a:ext uri="{28A0092B-C50C-407E-A947-70E740481C1C}">
+                <a14:useLocalDpi xmlns:a14="http://schemas.microsoft.com/office/drawing/2010/main" val="0"/>
+              </a:ext>
+            </a:extLst>
+          </a:blip>
+          <a:stretch>
+            <a:fillRect/>
+          </a:stretch>
+        </p:blipFill>
+        <p:spPr>
+          <a:xfrm>
+            <a:off x="734290" y="327109"/>
+            <a:ext cx="5375563" cy="4038783"/>
+          </a:xfrm>
+          <a:prstGeom prst="rect">
+            <a:avLst/>
+          </a:prstGeom>
+        </p:spPr>
+      </p:pic>
+      <p:sp>
+        <p:nvSpPr>
+          <p:cNvPr id="3" name="テキスト ボックス 2"/>
+          <p:cNvSpPr txBox="1"/>
+          <p:nvPr/>
+        </p:nvSpPr>
+        <p:spPr>
+          <a:xfrm>
+            <a:off x="533072" y="4365892"/>
+            <a:ext cx="5778000" cy="369332"/>
+          </a:xfrm>
+          <a:prstGeom prst="rect">
+            <a:avLst/>
+          </a:prstGeom>
+          <a:noFill/>
+        </p:spPr>
+        <p:txBody>
+          <a:bodyPr wrap="square" rtlCol="0">
+            <a:spAutoFit/>
+          </a:bodyPr>
+          <a:lstStyle/>
+          <a:p>
+            <a:pPr algn="ctr"/>
+            <a:r>
+              <a:rPr kumimoji="1" lang="en-US" altLang="ja-JP" dirty="0" smtClean="0">
+                <a:latin typeface="Times New Roman" panose="02020603050405020304" pitchFamily="18" charset="0"/>
+                <a:cs typeface="Times New Roman" panose="02020603050405020304" pitchFamily="18" charset="0"/>
+              </a:rPr>
+              <a:t>Figure </a:t>
+            </a:r>
+            <a:r>
+              <a:rPr lang="en-US" altLang="ja-JP" dirty="0" smtClean="0">
+                <a:latin typeface="Times New Roman" panose="02020603050405020304" pitchFamily="18" charset="0"/>
+                <a:cs typeface="Times New Roman" panose="02020603050405020304" pitchFamily="18" charset="0"/>
+              </a:rPr>
+              <a:t>12. </a:t>
+            </a:r>
+            <a:r>
+              <a:rPr lang="en-US" altLang="ja-JP" dirty="0" smtClean="0">
+                <a:latin typeface="Times New Roman" panose="02020603050405020304" pitchFamily="18" charset="0"/>
+                <a:cs typeface="Times New Roman" panose="02020603050405020304" pitchFamily="18" charset="0"/>
+              </a:rPr>
+              <a:t>Rate of air volume change</a:t>
+            </a:r>
+            <a:endParaRPr kumimoji="1" lang="ja-JP" altLang="en-US" dirty="0">
+              <a:latin typeface="Times New Roman" panose="02020603050405020304" pitchFamily="18" charset="0"/>
+              <a:cs typeface="Times New Roman" panose="02020603050405020304" pitchFamily="18" charset="0"/>
+            </a:endParaRPr>
+          </a:p>
+        </p:txBody>
+      </p:sp>
+    </p:spTree>
+    <p:extLst>
+      <p:ext uri="{BB962C8B-B14F-4D97-AF65-F5344CB8AC3E}">
+        <p14:creationId xmlns:p14="http://schemas.microsoft.com/office/powerpoint/2010/main" val="1111429432"/>
       </p:ext>
     </p:extLst>
   </p:cSld>
@@ -5446,77 +5558,9 @@
           <a:chExt cx="0" cy="0"/>
         </a:xfrm>
       </p:grpSpPr>
-      <p:sp>
-        <p:nvSpPr>
-          <p:cNvPr id="20" name="テキスト ボックス 19"/>
-          <p:cNvSpPr txBox="1"/>
-          <p:nvPr/>
-        </p:nvSpPr>
-        <p:spPr>
-          <a:xfrm>
-            <a:off x="540000" y="3637226"/>
-            <a:ext cx="5778000" cy="646331"/>
-          </a:xfrm>
-          <a:prstGeom prst="rect">
-            <a:avLst/>
-          </a:prstGeom>
-          <a:noFill/>
-        </p:spPr>
-        <p:txBody>
-          <a:bodyPr wrap="square" rtlCol="0">
-            <a:spAutoFit/>
-          </a:bodyPr>
-          <a:lstStyle/>
-          <a:p>
-            <a:pPr algn="ctr"/>
-            <a:r>
-              <a:rPr kumimoji="1" lang="en-US" altLang="ja-JP" dirty="0" smtClean="0">
-                <a:latin typeface="Times New Roman" panose="02020603050405020304" pitchFamily="18" charset="0"/>
-                <a:cs typeface="Times New Roman" panose="02020603050405020304" pitchFamily="18" charset="0"/>
-              </a:rPr>
-              <a:t>Figure </a:t>
-            </a:r>
-            <a:r>
-              <a:rPr lang="en-US" altLang="ja-JP" dirty="0">
-                <a:latin typeface="Times New Roman" panose="02020603050405020304" pitchFamily="18" charset="0"/>
-                <a:cs typeface="Times New Roman" panose="02020603050405020304" pitchFamily="18" charset="0"/>
-              </a:rPr>
-              <a:t>2</a:t>
-            </a:r>
-            <a:r>
-              <a:rPr kumimoji="1" lang="en-US" altLang="ja-JP" dirty="0" smtClean="0">
-                <a:latin typeface="Times New Roman" panose="02020603050405020304" pitchFamily="18" charset="0"/>
-                <a:cs typeface="Times New Roman" panose="02020603050405020304" pitchFamily="18" charset="0"/>
-              </a:rPr>
-              <a:t>. </a:t>
-            </a:r>
-            <a:r>
-              <a:rPr lang="en-US" altLang="ja-JP" dirty="0" smtClean="0">
-                <a:latin typeface="Times New Roman" panose="02020603050405020304" pitchFamily="18" charset="0"/>
-                <a:cs typeface="Times New Roman" panose="02020603050405020304" pitchFamily="18" charset="0"/>
-              </a:rPr>
-              <a:t>Powder distribution</a:t>
-            </a:r>
-          </a:p>
-          <a:p>
-            <a:pPr algn="ctr"/>
-            <a:r>
-              <a:rPr lang="en-US" altLang="ja-JP" dirty="0" smtClean="0">
-                <a:latin typeface="Times New Roman" panose="02020603050405020304" pitchFamily="18" charset="0"/>
-                <a:cs typeface="Times New Roman" panose="02020603050405020304" pitchFamily="18" charset="0"/>
-              </a:rPr>
-              <a:t>In case suction filling, the punch speed was 500 mm/s.</a:t>
-            </a:r>
-            <a:endParaRPr kumimoji="1" lang="ja-JP" altLang="en-US" dirty="0">
-              <a:latin typeface="Times New Roman" panose="02020603050405020304" pitchFamily="18" charset="0"/>
-              <a:cs typeface="Times New Roman" panose="02020603050405020304" pitchFamily="18" charset="0"/>
-            </a:endParaRPr>
-          </a:p>
-        </p:txBody>
-      </p:sp>
       <p:pic>
         <p:nvPicPr>
-          <p:cNvPr id="4" name="図 3"/>
+          <p:cNvPr id="3" name="図 2"/>
           <p:cNvPicPr>
             <a:picLocks noChangeAspect="1"/>
           </p:cNvPicPr>
@@ -5530,19 +5574,87 @@
               </a:ext>
             </a:extLst>
           </a:blip>
-          <a:srcRect b="49293"/>
+          <a:srcRect b="48889"/>
           <a:stretch/>
         </p:blipFill>
         <p:spPr>
           <a:xfrm>
-            <a:off x="0" y="0"/>
-            <a:ext cx="6858000" cy="3477491"/>
+            <a:off x="0" y="5979"/>
+            <a:ext cx="6858000" cy="3505200"/>
           </a:xfrm>
           <a:prstGeom prst="rect">
             <a:avLst/>
           </a:prstGeom>
         </p:spPr>
       </p:pic>
+      <p:sp>
+        <p:nvSpPr>
+          <p:cNvPr id="20" name="テキスト ボックス 19"/>
+          <p:cNvSpPr txBox="1"/>
+          <p:nvPr/>
+        </p:nvSpPr>
+        <p:spPr>
+          <a:xfrm>
+            <a:off x="540000" y="3637226"/>
+            <a:ext cx="5778000" cy="646331"/>
+          </a:xfrm>
+          <a:prstGeom prst="rect">
+            <a:avLst/>
+          </a:prstGeom>
+          <a:noFill/>
+        </p:spPr>
+        <p:txBody>
+          <a:bodyPr wrap="square" rtlCol="0">
+            <a:spAutoFit/>
+          </a:bodyPr>
+          <a:lstStyle/>
+          <a:p>
+            <a:pPr algn="ctr"/>
+            <a:r>
+              <a:rPr kumimoji="1" lang="en-US" altLang="ja-JP" dirty="0" smtClean="0">
+                <a:latin typeface="Times New Roman" panose="02020603050405020304" pitchFamily="18" charset="0"/>
+                <a:cs typeface="Times New Roman" panose="02020603050405020304" pitchFamily="18" charset="0"/>
+              </a:rPr>
+              <a:t>Figure </a:t>
+            </a:r>
+            <a:r>
+              <a:rPr lang="en-US" altLang="ja-JP" dirty="0">
+                <a:latin typeface="Times New Roman" panose="02020603050405020304" pitchFamily="18" charset="0"/>
+                <a:cs typeface="Times New Roman" panose="02020603050405020304" pitchFamily="18" charset="0"/>
+              </a:rPr>
+              <a:t>2</a:t>
+            </a:r>
+            <a:r>
+              <a:rPr kumimoji="1" lang="en-US" altLang="ja-JP" dirty="0" smtClean="0">
+                <a:latin typeface="Times New Roman" panose="02020603050405020304" pitchFamily="18" charset="0"/>
+                <a:cs typeface="Times New Roman" panose="02020603050405020304" pitchFamily="18" charset="0"/>
+              </a:rPr>
+              <a:t>. </a:t>
+            </a:r>
+            <a:r>
+              <a:rPr lang="en-US" altLang="ja-JP" dirty="0" smtClean="0">
+                <a:latin typeface="Times New Roman" panose="02020603050405020304" pitchFamily="18" charset="0"/>
+                <a:cs typeface="Times New Roman" panose="02020603050405020304" pitchFamily="18" charset="0"/>
+              </a:rPr>
+              <a:t>Powder distribution</a:t>
+            </a:r>
+          </a:p>
+          <a:p>
+            <a:pPr algn="ctr"/>
+            <a:r>
+              <a:rPr lang="en-US" altLang="ja-JP" dirty="0" smtClean="0">
+                <a:latin typeface="Times New Roman" panose="02020603050405020304" pitchFamily="18" charset="0"/>
+                <a:cs typeface="Times New Roman" panose="02020603050405020304" pitchFamily="18" charset="0"/>
+              </a:rPr>
+              <a:t>In case suction filling, the punch speed was 500 mm/s.</a:t>
+            </a:r>
+            <a:endParaRPr kumimoji="1" lang="ja-JP" altLang="en-US" dirty="0">
+              <a:latin typeface="Times New Roman" panose="02020603050405020304" pitchFamily="18" charset="0"/>
+              <a:cs typeface="Times New Roman" panose="02020603050405020304" pitchFamily="18" charset="0"/>
+            </a:endParaRPr>
+          </a:p>
+        </p:txBody>
+      </p:sp>
       <p:sp>
         <p:nvSpPr>
           <p:cNvPr id="7" name="テキスト ボックス 6"/>
@@ -6041,60 +6153,9 @@
           <a:chExt cx="0" cy="0"/>
         </a:xfrm>
       </p:grpSpPr>
-      <p:sp>
-        <p:nvSpPr>
-          <p:cNvPr id="41" name="テキスト ボックス 40"/>
-          <p:cNvSpPr txBox="1"/>
-          <p:nvPr/>
-        </p:nvSpPr>
-        <p:spPr>
-          <a:xfrm>
-            <a:off x="540000" y="7718612"/>
-            <a:ext cx="5778000" cy="369332"/>
-          </a:xfrm>
-          <a:prstGeom prst="rect">
-            <a:avLst/>
-          </a:prstGeom>
-          <a:noFill/>
-        </p:spPr>
-        <p:txBody>
-          <a:bodyPr wrap="square" rtlCol="0">
-            <a:spAutoFit/>
-          </a:bodyPr>
-          <a:lstStyle/>
-          <a:p>
-            <a:pPr algn="ctr"/>
-            <a:r>
-              <a:rPr kumimoji="1" lang="en-US" altLang="ja-JP" dirty="0" smtClean="0">
-                <a:latin typeface="Times New Roman" panose="02020603050405020304" pitchFamily="18" charset="0"/>
-                <a:cs typeface="Times New Roman" panose="02020603050405020304" pitchFamily="18" charset="0"/>
-              </a:rPr>
-              <a:t>Figure </a:t>
-            </a:r>
-            <a:r>
-              <a:rPr lang="en-US" altLang="ja-JP" dirty="0">
-                <a:latin typeface="Times New Roman" panose="02020603050405020304" pitchFamily="18" charset="0"/>
-                <a:cs typeface="Times New Roman" panose="02020603050405020304" pitchFamily="18" charset="0"/>
-              </a:rPr>
-              <a:t>7</a:t>
-            </a:r>
-            <a:r>
-              <a:rPr lang="en-US" altLang="ja-JP" dirty="0" smtClean="0">
-                <a:latin typeface="Times New Roman" panose="02020603050405020304" pitchFamily="18" charset="0"/>
-                <a:cs typeface="Times New Roman" panose="02020603050405020304" pitchFamily="18" charset="0"/>
-              </a:rPr>
-              <a:t>. Powder distribution</a:t>
-            </a:r>
-            <a:endParaRPr kumimoji="1" lang="ja-JP" altLang="en-US" dirty="0">
-              <a:latin typeface="Times New Roman" panose="02020603050405020304" pitchFamily="18" charset="0"/>
-              <a:cs typeface="Times New Roman" panose="02020603050405020304" pitchFamily="18" charset="0"/>
-            </a:endParaRPr>
-          </a:p>
-        </p:txBody>
-      </p:sp>
       <p:pic>
         <p:nvPicPr>
-          <p:cNvPr id="3" name="図 2"/>
+          <p:cNvPr id="2" name="図 1"/>
           <p:cNvPicPr>
             <a:picLocks noChangeAspect="1"/>
           </p:cNvPicPr>
@@ -6122,6 +6183,57 @@
           </a:prstGeom>
         </p:spPr>
       </p:pic>
+      <p:sp>
+        <p:nvSpPr>
+          <p:cNvPr id="41" name="テキスト ボックス 40"/>
+          <p:cNvSpPr txBox="1"/>
+          <p:nvPr/>
+        </p:nvSpPr>
+        <p:spPr>
+          <a:xfrm>
+            <a:off x="540000" y="7718612"/>
+            <a:ext cx="5778000" cy="369332"/>
+          </a:xfrm>
+          <a:prstGeom prst="rect">
+            <a:avLst/>
+          </a:prstGeom>
+          <a:noFill/>
+        </p:spPr>
+        <p:txBody>
+          <a:bodyPr wrap="square" rtlCol="0">
+            <a:spAutoFit/>
+          </a:bodyPr>
+          <a:lstStyle/>
+          <a:p>
+            <a:pPr algn="ctr"/>
+            <a:r>
+              <a:rPr kumimoji="1" lang="en-US" altLang="ja-JP" dirty="0" smtClean="0">
+                <a:latin typeface="Times New Roman" panose="02020603050405020304" pitchFamily="18" charset="0"/>
+                <a:cs typeface="Times New Roman" panose="02020603050405020304" pitchFamily="18" charset="0"/>
+              </a:rPr>
+              <a:t>Figure </a:t>
+            </a:r>
+            <a:r>
+              <a:rPr lang="en-US" altLang="ja-JP" dirty="0">
+                <a:latin typeface="Times New Roman" panose="02020603050405020304" pitchFamily="18" charset="0"/>
+                <a:cs typeface="Times New Roman" panose="02020603050405020304" pitchFamily="18" charset="0"/>
+              </a:rPr>
+              <a:t>7</a:t>
+            </a:r>
+            <a:r>
+              <a:rPr lang="en-US" altLang="ja-JP" dirty="0" smtClean="0">
+                <a:latin typeface="Times New Roman" panose="02020603050405020304" pitchFamily="18" charset="0"/>
+                <a:cs typeface="Times New Roman" panose="02020603050405020304" pitchFamily="18" charset="0"/>
+              </a:rPr>
+              <a:t>. Powder distribution</a:t>
+            </a:r>
+            <a:endParaRPr kumimoji="1" lang="ja-JP" altLang="en-US" dirty="0">
+              <a:latin typeface="Times New Roman" panose="02020603050405020304" pitchFamily="18" charset="0"/>
+              <a:cs typeface="Times New Roman" panose="02020603050405020304" pitchFamily="18" charset="0"/>
+            </a:endParaRPr>
+          </a:p>
+        </p:txBody>
+      </p:sp>
     </p:spTree>
     <p:extLst>
       <p:ext uri="{BB962C8B-B14F-4D97-AF65-F5344CB8AC3E}">
@@ -6375,18 +6487,11 @@
               <a:t>Figure </a:t>
             </a:r>
             <a:r>
-              <a:rPr lang="en-US" altLang="ja-JP" dirty="0">
-                <a:latin typeface="Times New Roman" panose="02020603050405020304" pitchFamily="18" charset="0"/>
-                <a:cs typeface="Times New Roman" panose="02020603050405020304" pitchFamily="18" charset="0"/>
-              </a:rPr>
-              <a:t>4</a:t>
-            </a:r>
-            <a:r>
               <a:rPr lang="en-US" altLang="ja-JP" dirty="0" smtClean="0">
                 <a:latin typeface="Times New Roman" panose="02020603050405020304" pitchFamily="18" charset="0"/>
                 <a:cs typeface="Times New Roman" panose="02020603050405020304" pitchFamily="18" charset="0"/>
               </a:rPr>
-              <a:t>. Drag force</a:t>
+              <a:t>10. Drag force</a:t>
             </a:r>
             <a:endParaRPr kumimoji="1" lang="ja-JP" altLang="en-US" dirty="0">
               <a:latin typeface="Times New Roman" panose="02020603050405020304" pitchFamily="18" charset="0"/>

</xml_diff>